<commit_message>
USE EXT tag under EXTLST and IT WORKS - see thankgos.pptx
</commit_message>
<xml_diff>
--- a/assets/test.pptx
+++ b/assets/test.pptx
@@ -261,7 +261,7 @@
           <a:p>
             <a:fld id="{731433F7-C324-2544-8E76-B1FEF040AD34}" type="datetimeFigureOut">
               <a:rPr lang="en-US" smtClean="0"/>
-              <a:t>9/1/22</a:t>
+              <a:t>8/31/22</a:t>
             </a:fld>
             <a:endParaRPr lang="en-US"/>
           </a:p>
@@ -459,7 +459,7 @@
           <a:p>
             <a:fld id="{731433F7-C324-2544-8E76-B1FEF040AD34}" type="datetimeFigureOut">
               <a:rPr lang="en-US" smtClean="0"/>
-              <a:t>9/1/22</a:t>
+              <a:t>8/31/22</a:t>
             </a:fld>
             <a:endParaRPr lang="en-US"/>
           </a:p>
@@ -667,7 +667,7 @@
           <a:p>
             <a:fld id="{731433F7-C324-2544-8E76-B1FEF040AD34}" type="datetimeFigureOut">
               <a:rPr lang="en-US" smtClean="0"/>
-              <a:t>9/1/22</a:t>
+              <a:t>8/31/22</a:t>
             </a:fld>
             <a:endParaRPr lang="en-US"/>
           </a:p>
@@ -865,7 +865,7 @@
           <a:p>
             <a:fld id="{731433F7-C324-2544-8E76-B1FEF040AD34}" type="datetimeFigureOut">
               <a:rPr lang="en-US" smtClean="0"/>
-              <a:t>9/1/22</a:t>
+              <a:t>8/31/22</a:t>
             </a:fld>
             <a:endParaRPr lang="en-US"/>
           </a:p>
@@ -1140,7 +1140,7 @@
           <a:p>
             <a:fld id="{731433F7-C324-2544-8E76-B1FEF040AD34}" type="datetimeFigureOut">
               <a:rPr lang="en-US" smtClean="0"/>
-              <a:t>9/1/22</a:t>
+              <a:t>8/31/22</a:t>
             </a:fld>
             <a:endParaRPr lang="en-US"/>
           </a:p>
@@ -1405,7 +1405,7 @@
           <a:p>
             <a:fld id="{731433F7-C324-2544-8E76-B1FEF040AD34}" type="datetimeFigureOut">
               <a:rPr lang="en-US" smtClean="0"/>
-              <a:t>9/1/22</a:t>
+              <a:t>8/31/22</a:t>
             </a:fld>
             <a:endParaRPr lang="en-US"/>
           </a:p>
@@ -1817,7 +1817,7 @@
           <a:p>
             <a:fld id="{731433F7-C324-2544-8E76-B1FEF040AD34}" type="datetimeFigureOut">
               <a:rPr lang="en-US" smtClean="0"/>
-              <a:t>9/1/22</a:t>
+              <a:t>8/31/22</a:t>
             </a:fld>
             <a:endParaRPr lang="en-US"/>
           </a:p>
@@ -1958,7 +1958,7 @@
           <a:p>
             <a:fld id="{731433F7-C324-2544-8E76-B1FEF040AD34}" type="datetimeFigureOut">
               <a:rPr lang="en-US" smtClean="0"/>
-              <a:t>9/1/22</a:t>
+              <a:t>8/31/22</a:t>
             </a:fld>
             <a:endParaRPr lang="en-US"/>
           </a:p>
@@ -2071,7 +2071,7 @@
           <a:p>
             <a:fld id="{731433F7-C324-2544-8E76-B1FEF040AD34}" type="datetimeFigureOut">
               <a:rPr lang="en-US" smtClean="0"/>
-              <a:t>9/1/22</a:t>
+              <a:t>8/31/22</a:t>
             </a:fld>
             <a:endParaRPr lang="en-US"/>
           </a:p>
@@ -2382,7 +2382,7 @@
           <a:p>
             <a:fld id="{731433F7-C324-2544-8E76-B1FEF040AD34}" type="datetimeFigureOut">
               <a:rPr lang="en-US" smtClean="0"/>
-              <a:t>9/1/22</a:t>
+              <a:t>8/31/22</a:t>
             </a:fld>
             <a:endParaRPr lang="en-US"/>
           </a:p>
@@ -2670,7 +2670,7 @@
           <a:p>
             <a:fld id="{731433F7-C324-2544-8E76-B1FEF040AD34}" type="datetimeFigureOut">
               <a:rPr lang="en-US" smtClean="0"/>
-              <a:t>9/1/22</a:t>
+              <a:t>8/31/22</a:t>
             </a:fld>
             <a:endParaRPr lang="en-US"/>
           </a:p>
@@ -2911,7 +2911,7 @@
           <a:p>
             <a:fld id="{731433F7-C324-2544-8E76-B1FEF040AD34}" type="datetimeFigureOut">
               <a:rPr lang="en-US" smtClean="0"/>
-              <a:t>9/1/22</a:t>
+              <a:t>8/31/22</a:t>
             </a:fld>
             <a:endParaRPr lang="en-US"/>
           </a:p>
@@ -3312,7 +3312,7 @@
 </file>
 
 <file path=ppt/slides/slide1.xml><?xml version="1.0" encoding="utf-8"?>
-<p:sld xmlns:a="http://schemas.openxmlformats.org/drawingml/2006/main" xmlns:r="http://schemas.openxmlformats.org/officeDocument/2006/relationships" xmlns:p="http://schemas.openxmlformats.org/presentationml/2006/main">
+<p:sld xmlns:a16="http://schemas.microsoft.com/office/drawing/2014/main" xmlns:a14="http://schemas.microsoft.com/office/drawing/2010/main" xmlns:p14="http://schemas.microsoft.com/office/powerpoint/2010/main" xmlns:a="http://schemas.openxmlformats.org/drawingml/2006/main" xmlns:r="http://schemas.openxmlformats.org/officeDocument/2006/relationships" xmlns:p="http://schemas.openxmlformats.org/presentationml/2006/main">
   <p:cSld>
     <p:spTree>
       <p:nvGrpSpPr>
@@ -3381,7 +3381,39 @@
           </a:p>
         </p:txBody>
       </p:sp>
-      <p:pic>
+      <p:pic Type="query-mixpanel-insights">
+        <p:nvPicPr test="100">
+          <p:cNvPr id="3" name="My Shape" test="100">
+            <p:extLst>
+              <p:ext uri="test-uri"/>
+            </p:extLst>
+          </p:cNvPr>
+          <p:cNvPicPr test="100">
+            <a:picLocks noChangeAspect="1"/>
+          </p:cNvPicPr>
+          <p:nvPr/>
+        </p:nvPicPr>
+        <p:blipFill test="100">
+          <a:blip r:embed="Rc4cafe2c296c46f8">
+            <a:extLst>
+              <a:ext uri="{28A0092B-C50C-407E-A947-70E740481C1C}" test="100">
+                <a14:useLocalDpi xmlns:a14="http://schemas.microsoft.com/office/drawing/2010/main" val="0"/>
+              </a:ext>
+            </a:extLst>
+          </a:blip>
+          <a:stretch>
+            <a:fillRect/>
+          </a:stretch>
+        </p:blipFill>
+        <p:spPr test="100">
+          <a:xfrm>
+            <a:off x="0" y="0"/>
+            <a:ext cx="1000000" cy="1000000"/>
+          </a:xfrm>
+          <a:prstGeom prst="rect"/>
+        </p:spPr>
+      </p:pic>
+      <p:pic Type="query-mixpanel-insights">
         <p:nvPicPr>
           <p:cNvPr id="4" name="My Shape"/>
           <p:cNvPicPr>
@@ -3390,7 +3422,7 @@
           <p:nvPr/>
         </p:nvPicPr>
         <p:blipFill>
-          <a:blip r:embed="rId2">
+          <a:blip r:embed="Ra3ea9fe353d641a7">
             <a:extLst>
               <a:ext uri="{28A0092B-C50C-407E-A947-70E740481C1C}">
                 <a14:useLocalDpi xmlns:a14="http://schemas.microsoft.com/office/drawing/2010/main" val="0"/>
@@ -3403,12 +3435,38 @@
         </p:blipFill>
         <p:spPr>
           <a:xfrm>
-            <a:off x="2880986" y="864296"/>
+            <a:off x="0" y="0"/>
             <a:ext cx="1000000" cy="1000000"/>
           </a:xfrm>
-          <a:prstGeom prst="rect">
-            <a:avLst/>
-          </a:prstGeom>
+          <a:prstGeom prst="rect"/>
+        </p:spPr>
+      </p:pic>
+      <p:pic Type="query-mixpanel-insights">
+        <p:nvPicPr>
+          <p:cNvPr id="5" name="My Shape"/>
+          <p:cNvPicPr>
+            <a:picLocks noChangeAspect="1"/>
+          </p:cNvPicPr>
+          <p:nvPr/>
+        </p:nvPicPr>
+        <p:blipFill>
+          <a:blip r:embed="Rab489f442a834f52">
+            <a:extLst>
+              <a:ext uri="{hello}">
+                <a14:useLocalDpi xmlns:a14="http://schemas.microsoft.com/office/drawing/2010/main" val="0"/>
+              </a:ext>
+            </a:extLst>
+          </a:blip>
+          <a:stretch>
+            <a:fillRect/>
+          </a:stretch>
+        </p:blipFill>
+        <p:spPr>
+          <a:xfrm>
+            <a:off x="0" y="0"/>
+            <a:ext cx="1000000" cy="1000000"/>
+          </a:xfrm>
+          <a:prstGeom prst="rect"/>
         </p:spPr>
       </p:pic>
     </p:spTree>

</xml_diff>

<commit_message>
working extension list being added to cNvPr element :
</commit_message>
<xml_diff>
--- a/assets/test.pptx
+++ b/assets/test.pptx
@@ -3382,47 +3382,21 @@
         </p:txBody>
       </p:sp>
       <p:pic Type="query-mixpanel-insights">
-        <p:nvPicPr test="100">
-          <p:cNvPr id="3" name="My Shape" test="100">
-            <p:extLst>
-              <p:ext uri="test-uri"/>
-            </p:extLst>
-          </p:cNvPr>
-          <p:cNvPicPr test="100">
-            <a:picLocks noChangeAspect="1"/>
-          </p:cNvPicPr>
-          <p:nvPr/>
-        </p:nvPicPr>
-        <p:blipFill test="100">
-          <a:blip r:embed="Rc4cafe2c296c46f8">
-            <a:extLst>
-              <a:ext uri="{28A0092B-C50C-407E-A947-70E740481C1C}" test="100">
-                <a14:useLocalDpi xmlns:a14="http://schemas.microsoft.com/office/drawing/2010/main" val="0"/>
-              </a:ext>
-            </a:extLst>
-          </a:blip>
-          <a:stretch>
-            <a:fillRect/>
-          </a:stretch>
-        </p:blipFill>
-        <p:spPr test="100">
-          <a:xfrm>
-            <a:off x="0" y="0"/>
-            <a:ext cx="1000000" cy="1000000"/>
-          </a:xfrm>
-          <a:prstGeom prst="rect"/>
-        </p:spPr>
-      </p:pic>
-      <p:pic Type="query-mixpanel-insights">
         <p:nvPicPr>
-          <p:cNvPr id="4" name="My Shape"/>
+          <p:cNvPr id="3" name="My Shape">
+            <a:extLst>
+              <a:ext uri="{generated-asset}">
+                <Type>line-graph</Type>
+              </a:ext>
+            </a:extLst>
+          </p:cNvPr>
           <p:cNvPicPr>
             <a:picLocks noChangeAspect="1"/>
           </p:cNvPicPr>
           <p:nvPr/>
         </p:nvPicPr>
         <p:blipFill>
-          <a:blip r:embed="Ra3ea9fe353d641a7">
+          <a:blip r:embed="R46cd68c234234024">
             <a:extLst>
               <a:ext uri="{28A0092B-C50C-407E-A947-70E740481C1C}">
                 <a14:useLocalDpi xmlns:a14="http://schemas.microsoft.com/office/drawing/2010/main" val="0"/>
@@ -3441,18 +3415,24 @@
           <a:prstGeom prst="rect"/>
         </p:spPr>
       </p:pic>
-      <p:pic Type="query-mixpanel-insights">
+      <p:pic>
         <p:nvPicPr>
-          <p:cNvPr id="5" name="My Shape"/>
+          <p:cNvPr id="4" name="My Shape">
+            <a:extLst>
+              <a:ext uri="{generated-asset}">
+                <Type>line-graph</Type>
+              </a:ext>
+            </a:extLst>
+          </p:cNvPr>
           <p:cNvPicPr>
             <a:picLocks noChangeAspect="1"/>
           </p:cNvPicPr>
           <p:nvPr/>
         </p:nvPicPr>
         <p:blipFill>
-          <a:blip r:embed="Rab489f442a834f52">
-            <a:extLst>
-              <a:ext uri="{hello}">
+          <a:blip r:embed="R0d6509c3b9cc4dac">
+            <a:extLst>
+              <a:ext uri="{28A0092B-C50C-407E-A947-70E740481C1C}">
                 <a14:useLocalDpi xmlns:a14="http://schemas.microsoft.com/office/drawing/2010/main" val="0"/>
               </a:ext>
             </a:extLst>

</xml_diff>

<commit_message>
cleaned up some w/ namespace
</commit_message>
<xml_diff>
--- a/assets/test.pptx
+++ b/assets/test.pptx
@@ -3449,6 +3449,40 @@
           <a:prstGeom prst="rect"/>
         </p:spPr>
       </p:pic>
+      <p:pic>
+        <p:nvPicPr>
+          <p:cNvPr id="5" name="Generated Shape">
+            <a:extLst>
+              <a:ext uri="{generated-asset}">
+                <Type>line-graph</Type>
+              </a:ext>
+            </a:extLst>
+          </p:cNvPr>
+          <p:cNvPicPr>
+            <a:picLocks noChangeAspect="1"/>
+          </p:cNvPicPr>
+          <p:nvPr/>
+        </p:nvPicPr>
+        <p:blipFill>
+          <a:blip r:embed="R242d81602ea84773">
+            <a:extLst>
+              <a:ext uri="{28A0092B-C50C-407E-A947-70E740481C1C}">
+                <a14:useLocalDpi xmlns:a14="http://schemas.microsoft.com/office/drawing/2010/main" val="0"/>
+              </a:ext>
+            </a:extLst>
+          </a:blip>
+          <a:stretch>
+            <a:fillRect/>
+          </a:stretch>
+        </p:blipFill>
+        <p:spPr>
+          <a:xfrm>
+            <a:off x="0" y="0"/>
+            <a:ext cx="1000000" cy="1000000"/>
+          </a:xfrm>
+          <a:prstGeom prst="rect"/>
+        </p:spPr>
+      </p:pic>
     </p:spTree>
     <p:extLst>
       <p:ext uri="{BB962C8B-B14F-4D97-AF65-F5344CB8AC3E}">

</xml_diff>

<commit_message>
images are being replaced :)
</commit_message>
<xml_diff>
--- a/assets/test.pptx
+++ b/assets/test.pptx
@@ -3381,9 +3381,9 @@
           </a:p>
         </p:txBody>
       </p:sp>
-      <p:pic Type="query-mixpanel-insights">
+      <p:pic>
         <p:nvPicPr>
-          <p:cNvPr id="3" name="My Shape">
+          <p:cNvPr id="3" name="Generated Shape">
             <a:extLst>
               <a:ext uri="{generated-asset}">
                 <Type>line-graph</Type>
@@ -3396,7 +3396,7 @@
           <p:nvPr/>
         </p:nvPicPr>
         <p:blipFill>
-          <a:blip r:embed="R46cd68c234234024">
+          <a:blip r:embed="R6258ebb587b24ec1">
             <a:extLst>
               <a:ext uri="{28A0092B-C50C-407E-A947-70E740481C1C}">
                 <a14:useLocalDpi xmlns:a14="http://schemas.microsoft.com/office/drawing/2010/main" val="0"/>
@@ -3417,10 +3417,10 @@
       </p:pic>
       <p:pic>
         <p:nvPicPr>
-          <p:cNvPr id="4" name="My Shape">
+          <p:cNvPr id="4" name="Generated Shape">
             <a:extLst>
               <a:ext uri="{generated-asset}">
-                <Type>line-graph</Type>
+                <type>test value</type>
               </a:ext>
             </a:extLst>
           </p:cNvPr>
@@ -3430,7 +3430,7 @@
           <p:nvPr/>
         </p:nvPicPr>
         <p:blipFill>
-          <a:blip r:embed="R0d6509c3b9cc4dac">
+          <a:blip r:embed="R88fb1e6cbed74d91">
             <a:extLst>
               <a:ext uri="{28A0092B-C50C-407E-A947-70E740481C1C}">
                 <a14:useLocalDpi xmlns:a14="http://schemas.microsoft.com/office/drawing/2010/main" val="0"/>
@@ -3454,7 +3454,7 @@
           <p:cNvPr id="5" name="Generated Shape">
             <a:extLst>
               <a:ext uri="{generated-asset}">
-                <Type>line-graph</Type>
+                <type>test value</type>
               </a:ext>
             </a:extLst>
           </p:cNvPr>
@@ -3464,7 +3464,7 @@
           <p:nvPr/>
         </p:nvPicPr>
         <p:blipFill>
-          <a:blip r:embed="R242d81602ea84773">
+          <a:blip r:embed="R87d79f297ba341b9">
             <a:extLst>
               <a:ext uri="{28A0092B-C50C-407E-A947-70E740481C1C}">
                 <a14:useLocalDpi xmlns:a14="http://schemas.microsoft.com/office/drawing/2010/main" val="0"/>
@@ -3497,7 +3497,7 @@
 </file>
 
 <file path=ppt/slides/slide2.xml><?xml version="1.0" encoding="utf-8"?>
-<p:sld xmlns:a="http://schemas.openxmlformats.org/drawingml/2006/main" xmlns:r="http://schemas.openxmlformats.org/officeDocument/2006/relationships" xmlns:p="http://schemas.openxmlformats.org/presentationml/2006/main">
+<p:sld xmlns:a16="http://schemas.microsoft.com/office/drawing/2014/main" xmlns:p14="http://schemas.microsoft.com/office/powerpoint/2010/main" xmlns:a="http://schemas.openxmlformats.org/drawingml/2006/main" xmlns:r="http://schemas.openxmlformats.org/officeDocument/2006/relationships" xmlns:p="http://schemas.openxmlformats.org/presentationml/2006/main">
   <p:cSld>
     <p:spTree>
       <p:nvGrpSpPr>
@@ -3611,7 +3611,7 @@
 </file>
 
 <file path=ppt/slides/slide3.xml><?xml version="1.0" encoding="utf-8"?>
-<p:sld xmlns:a="http://schemas.openxmlformats.org/drawingml/2006/main" xmlns:r="http://schemas.openxmlformats.org/officeDocument/2006/relationships" xmlns:p="http://schemas.openxmlformats.org/presentationml/2006/main">
+<p:sld xmlns:a16="http://schemas.microsoft.com/office/drawing/2014/main" xmlns:p14="http://schemas.microsoft.com/office/powerpoint/2010/main" xmlns:a="http://schemas.openxmlformats.org/drawingml/2006/main" xmlns:r="http://schemas.openxmlformats.org/officeDocument/2006/relationships" xmlns:p="http://schemas.openxmlformats.org/presentationml/2006/main">
   <p:cSld>
     <p:spTree>
       <p:nvGrpSpPr>

</xml_diff>